<commit_message>
prezentacio frissitve + segedlet
</commit_message>
<xml_diff>
--- a/documentation/Automatizált adatbázis-frissítés.pptx
+++ b/documentation/Automatizált adatbázis-frissítés.pptx
@@ -5,10 +5,10 @@
     <p:sldMasterId id="2147483834" r:id="rId1"/>
   </p:sldMasterIdLst>
   <p:notesMasterIdLst>
-    <p:notesMasterId r:id="rId12"/>
+    <p:notesMasterId r:id="rId14"/>
   </p:notesMasterIdLst>
   <p:handoutMasterIdLst>
-    <p:handoutMasterId r:id="rId13"/>
+    <p:handoutMasterId r:id="rId15"/>
   </p:handoutMasterIdLst>
   <p:sldIdLst>
     <p:sldId id="256" r:id="rId2"/>
@@ -16,11 +16,13 @@
     <p:sldId id="258" r:id="rId4"/>
     <p:sldId id="259" r:id="rId5"/>
     <p:sldId id="260" r:id="rId6"/>
-    <p:sldId id="261" r:id="rId7"/>
-    <p:sldId id="262" r:id="rId8"/>
-    <p:sldId id="263" r:id="rId9"/>
-    <p:sldId id="264" r:id="rId10"/>
-    <p:sldId id="266" r:id="rId11"/>
+    <p:sldId id="268" r:id="rId7"/>
+    <p:sldId id="261" r:id="rId8"/>
+    <p:sldId id="262" r:id="rId9"/>
+    <p:sldId id="263" r:id="rId10"/>
+    <p:sldId id="267" r:id="rId11"/>
+    <p:sldId id="264" r:id="rId12"/>
+    <p:sldId id="266" r:id="rId13"/>
   </p:sldIdLst>
   <p:sldSz cx="12192000" cy="6858000"/>
   <p:notesSz cx="6858000" cy="9144000"/>
@@ -2085,6 +2087,13 @@
         </dgm:presLayoutVars>
       </dgm:prSet>
       <dgm:spPr/>
+      <dgm:t>
+        <a:bodyPr/>
+        <a:lstStyle/>
+        <a:p>
+          <a:endParaRPr lang="hu-HU"/>
+        </a:p>
+      </dgm:t>
     </dgm:pt>
     <dgm:pt modelId="{57619896-4D83-4595-AB9B-AF4C402F3D9C}" type="pres">
       <dgm:prSet presAssocID="{DFEA64E0-DE9C-4001-BB63-A1D7F23AE9D9}" presName="node" presStyleLbl="node1" presStyleIdx="0" presStyleCnt="5">
@@ -2093,6 +2102,13 @@
         </dgm:presLayoutVars>
       </dgm:prSet>
       <dgm:spPr/>
+      <dgm:t>
+        <a:bodyPr/>
+        <a:lstStyle/>
+        <a:p>
+          <a:endParaRPr lang="hu-HU"/>
+        </a:p>
+      </dgm:t>
     </dgm:pt>
     <dgm:pt modelId="{DD9F03C1-A1EE-4DDF-96DD-ADD27FBE50EE}" type="pres">
       <dgm:prSet presAssocID="{6DC9DF9D-494C-4352-98E5-6E966BA4C282}" presName="sibTrans" presStyleCnt="0"/>
@@ -2105,6 +2121,13 @@
         </dgm:presLayoutVars>
       </dgm:prSet>
       <dgm:spPr/>
+      <dgm:t>
+        <a:bodyPr/>
+        <a:lstStyle/>
+        <a:p>
+          <a:endParaRPr lang="hu-HU"/>
+        </a:p>
+      </dgm:t>
     </dgm:pt>
     <dgm:pt modelId="{7B9B77A6-86BF-4EE5-9510-44C02CAE9604}" type="pres">
       <dgm:prSet presAssocID="{6F9D4C2F-9676-4A03-8C2D-5ABC75FEC7A9}" presName="sibTrans" presStyleCnt="0"/>
@@ -2117,6 +2140,13 @@
         </dgm:presLayoutVars>
       </dgm:prSet>
       <dgm:spPr/>
+      <dgm:t>
+        <a:bodyPr/>
+        <a:lstStyle/>
+        <a:p>
+          <a:endParaRPr lang="hu-HU"/>
+        </a:p>
+      </dgm:t>
     </dgm:pt>
     <dgm:pt modelId="{A4B4F7A4-EEB1-454B-812E-FD1FA18F3E82}" type="pres">
       <dgm:prSet presAssocID="{B7A2DBD1-F738-4C10-BFF6-AE1AF6F4EB6A}" presName="sibTrans" presStyleCnt="0"/>
@@ -2148,11 +2178,18 @@
         </dgm:presLayoutVars>
       </dgm:prSet>
       <dgm:spPr/>
+      <dgm:t>
+        <a:bodyPr/>
+        <a:lstStyle/>
+        <a:p>
+          <a:endParaRPr lang="hu-HU"/>
+        </a:p>
+      </dgm:t>
     </dgm:pt>
   </dgm:ptLst>
   <dgm:cxnLst>
+    <dgm:cxn modelId="{775B2C21-3B3E-473C-B184-0C0888E5EB97}" type="presOf" srcId="{4CFDEC31-4326-4560-96D5-11406F35A01E}" destId="{4443312A-F371-49A7-BF65-391FCAD34CCD}" srcOrd="0" destOrd="0" presId="urn:microsoft.com/office/officeart/2005/8/layout/default"/>
     <dgm:cxn modelId="{B2F6A885-2B3E-4240-BF5F-F2A0F9D30E28}" type="presOf" srcId="{D898C1DA-ED26-41A8-A641-75FB779AB50A}" destId="{C17C8AE9-A72D-4335-A16F-6AA69676B480}" srcOrd="0" destOrd="0" presId="urn:microsoft.com/office/officeart/2005/8/layout/default"/>
-    <dgm:cxn modelId="{775B2C21-3B3E-473C-B184-0C0888E5EB97}" type="presOf" srcId="{4CFDEC31-4326-4560-96D5-11406F35A01E}" destId="{4443312A-F371-49A7-BF65-391FCAD34CCD}" srcOrd="0" destOrd="0" presId="urn:microsoft.com/office/officeart/2005/8/layout/default"/>
     <dgm:cxn modelId="{6098E444-63DA-4720-8F8E-567E762A9684}" srcId="{56DC3E0D-E9CB-45EF-87EB-D9D73F183540}" destId="{A9F43A66-7B4C-480B-94BB-AA97F35472B3}" srcOrd="2" destOrd="0" parTransId="{E6F5E54A-9EA2-4099-AE1E-ED32F9046F4F}" sibTransId="{B7A2DBD1-F738-4C10-BFF6-AE1AF6F4EB6A}"/>
     <dgm:cxn modelId="{B208C579-0419-4E5C-88A2-FCF572FD0F41}" type="presOf" srcId="{56DC3E0D-E9CB-45EF-87EB-D9D73F183540}" destId="{64F22221-F9DA-4EC9-9281-FA331055FEF4}" srcOrd="0" destOrd="0" presId="urn:microsoft.com/office/officeart/2005/8/layout/default"/>
     <dgm:cxn modelId="{654D791D-EAC7-44D2-A264-2700A8DDE266}" srcId="{56DC3E0D-E9CB-45EF-87EB-D9D73F183540}" destId="{4A1B05D7-3516-47E0-9E0D-053B4A0D5EF8}" srcOrd="3" destOrd="0" parTransId="{D9E6A53A-6C87-4D35-9C1A-FC97828ACF01}" sibTransId="{006721BD-312B-4277-AB36-F5FF9A21482E}"/>
@@ -5841,7 +5878,7 @@
           <a:p>
             <a:fld id="{1437A701-2A03-4C40-A548-0A715545A217}" type="datetimeFigureOut">
               <a:rPr lang="hu-HU" smtClean="0"/>
-              <a:t>2017.05.15.</a:t>
+              <a:t>2017.05.16.</a:t>
             </a:fld>
             <a:endParaRPr lang="hu-HU"/>
           </a:p>
@@ -6007,7 +6044,7 @@
           <a:p>
             <a:fld id="{DB487680-A192-4E89-8F2F-6873EED3E966}" type="datetimeFigureOut">
               <a:rPr lang="hu-HU" smtClean="0"/>
-              <a:t>2017.05.15.</a:t>
+              <a:t>2017.05.16.</a:t>
             </a:fld>
             <a:endParaRPr lang="hu-HU"/>
           </a:p>
@@ -6462,7 +6499,7 @@
           <a:p>
             <a:fld id="{1EBB11F0-AEC2-42DC-8B51-2490A40C37F5}" type="datetime1">
               <a:rPr lang="hu-HU" smtClean="0"/>
-              <a:t>2017.05.15.</a:t>
+              <a:t>2017.05.16.</a:t>
             </a:fld>
             <a:endParaRPr lang="hu-HU"/>
           </a:p>
@@ -6737,7 +6774,7 @@
           <a:p>
             <a:fld id="{620D1345-4E4F-418B-B886-E36AACF7EA6F}" type="datetime1">
               <a:rPr lang="hu-HU" smtClean="0"/>
-              <a:t>2017.05.15.</a:t>
+              <a:t>2017.05.16.</a:t>
             </a:fld>
             <a:endParaRPr lang="hu-HU"/>
           </a:p>
@@ -6931,7 +6968,7 @@
           <a:p>
             <a:fld id="{CA1D36D7-E563-40B3-BB99-3C99028C99D2}" type="datetime1">
               <a:rPr lang="hu-HU" smtClean="0"/>
-              <a:t>2017.05.15.</a:t>
+              <a:t>2017.05.16.</a:t>
             </a:fld>
             <a:endParaRPr lang="hu-HU"/>
           </a:p>
@@ -7204,7 +7241,7 @@
           <a:p>
             <a:fld id="{B933B8FB-E086-491C-98B7-9DABC027678A}" type="datetime1">
               <a:rPr lang="hu-HU" smtClean="0"/>
-              <a:t>2017.05.15.</a:t>
+              <a:t>2017.05.16.</a:t>
             </a:fld>
             <a:endParaRPr lang="hu-HU"/>
           </a:p>
@@ -7545,7 +7582,7 @@
           <a:p>
             <a:fld id="{18AE3721-1851-44DE-8534-A5AA5D431D1B}" type="datetime1">
               <a:rPr lang="hu-HU" smtClean="0"/>
-              <a:t>2017.05.15.</a:t>
+              <a:t>2017.05.16.</a:t>
             </a:fld>
             <a:endParaRPr lang="hu-HU"/>
           </a:p>
@@ -8168,7 +8205,7 @@
           <a:p>
             <a:fld id="{2DC5F012-9C2B-4D03-B530-CEECED67D2B9}" type="datetime1">
               <a:rPr lang="hu-HU" smtClean="0"/>
-              <a:t>2017.05.15.</a:t>
+              <a:t>2017.05.16.</a:t>
             </a:fld>
             <a:endParaRPr lang="hu-HU"/>
           </a:p>
@@ -9028,7 +9065,7 @@
           <a:p>
             <a:fld id="{F90FF73C-14C9-4FE9-9A55-4708EC9D66F3}" type="datetime1">
               <a:rPr lang="hu-HU" smtClean="0"/>
-              <a:t>2017.05.15.</a:t>
+              <a:t>2017.05.16.</a:t>
             </a:fld>
             <a:endParaRPr lang="hu-HU"/>
           </a:p>
@@ -9198,7 +9235,7 @@
           <a:p>
             <a:fld id="{B3AF0E55-A070-40E9-8E97-FA03B2A7B816}" type="datetime1">
               <a:rPr lang="hu-HU" smtClean="0"/>
-              <a:t>2017.05.15.</a:t>
+              <a:t>2017.05.16.</a:t>
             </a:fld>
             <a:endParaRPr lang="hu-HU"/>
           </a:p>
@@ -9378,7 +9415,7 @@
           <a:p>
             <a:fld id="{7C2F6040-3975-4561-A1F3-19EFCBF6184B}" type="datetime1">
               <a:rPr lang="hu-HU" smtClean="0"/>
-              <a:t>2017.05.15.</a:t>
+              <a:t>2017.05.16.</a:t>
             </a:fld>
             <a:endParaRPr lang="hu-HU"/>
           </a:p>
@@ -9548,7 +9585,7 @@
           <a:p>
             <a:fld id="{A19007DB-80F0-4EC3-80D0-B54306B96C14}" type="datetime1">
               <a:rPr lang="hu-HU" smtClean="0"/>
-              <a:t>2017.05.15.</a:t>
+              <a:t>2017.05.16.</a:t>
             </a:fld>
             <a:endParaRPr lang="hu-HU"/>
           </a:p>
@@ -9795,7 +9832,7 @@
           <a:p>
             <a:fld id="{2F919AB2-F29A-4AE4-B7A9-3C12B8A15B41}" type="datetime1">
               <a:rPr lang="hu-HU" smtClean="0"/>
-              <a:t>2017.05.15.</a:t>
+              <a:t>2017.05.16.</a:t>
             </a:fld>
             <a:endParaRPr lang="hu-HU"/>
           </a:p>
@@ -10087,7 +10124,7 @@
           <a:p>
             <a:fld id="{66D2AB43-6120-4BF1-B16E-C40A83655727}" type="datetime1">
               <a:rPr lang="hu-HU" smtClean="0"/>
-              <a:t>2017.05.15.</a:t>
+              <a:t>2017.05.16.</a:t>
             </a:fld>
             <a:endParaRPr lang="hu-HU"/>
           </a:p>
@@ -10531,7 +10568,7 @@
           <a:p>
             <a:fld id="{564F4282-B233-496F-99D5-AC67E5B11C9B}" type="datetime1">
               <a:rPr lang="hu-HU" smtClean="0"/>
-              <a:t>2017.05.15.</a:t>
+              <a:t>2017.05.16.</a:t>
             </a:fld>
             <a:endParaRPr lang="hu-HU"/>
           </a:p>
@@ -10649,7 +10686,7 @@
           <a:p>
             <a:fld id="{64732A7D-D0E9-464A-B230-220544AF48C8}" type="datetime1">
               <a:rPr lang="hu-HU" smtClean="0"/>
-              <a:t>2017.05.15.</a:t>
+              <a:t>2017.05.16.</a:t>
             </a:fld>
             <a:endParaRPr lang="hu-HU"/>
           </a:p>
@@ -10744,7 +10781,7 @@
           <a:p>
             <a:fld id="{663C295C-5C72-42E4-A221-B2BB41BC6123}" type="datetime1">
               <a:rPr lang="hu-HU" smtClean="0"/>
-              <a:t>2017.05.15.</a:t>
+              <a:t>2017.05.16.</a:t>
             </a:fld>
             <a:endParaRPr lang="hu-HU"/>
           </a:p>
@@ -11023,7 +11060,7 @@
           <a:p>
             <a:fld id="{0D45180B-43F8-404B-B11F-73798F62A61B}" type="datetime1">
               <a:rPr lang="hu-HU" smtClean="0"/>
-              <a:t>2017.05.15.</a:t>
+              <a:t>2017.05.16.</a:t>
             </a:fld>
             <a:endParaRPr lang="hu-HU"/>
           </a:p>
@@ -11298,7 +11335,7 @@
           <a:p>
             <a:fld id="{B3502718-5056-4D2D-9AA4-AE45097EB575}" type="datetime1">
               <a:rPr lang="hu-HU" smtClean="0"/>
-              <a:t>2017.05.15.</a:t>
+              <a:t>2017.05.16.</a:t>
             </a:fld>
             <a:endParaRPr lang="hu-HU"/>
           </a:p>
@@ -11727,7 +11764,7 @@
           <a:p>
             <a:fld id="{B2F546BB-D155-472D-AF81-88B3D1FECBC5}" type="datetime1">
               <a:rPr lang="hu-HU" smtClean="0"/>
-              <a:t>2017.05.15.</a:t>
+              <a:t>2017.05.16.</a:t>
             </a:fld>
             <a:endParaRPr lang="hu-HU"/>
           </a:p>
@@ -12378,12 +12415,41 @@
           <a:p>
             <a:r>
               <a:rPr lang="hu-HU" dirty="0" smtClean="0"/>
-              <a:t>Köszönöm a figyelmet!</a:t>
+              <a:t>Adatmodell</a:t>
             </a:r>
             <a:endParaRPr lang="hu-HU" dirty="0"/>
           </a:p>
         </p:txBody>
       </p:sp>
+      <p:pic>
+        <p:nvPicPr>
+          <p:cNvPr id="5" name="Tartalom helye 4"/>
+          <p:cNvPicPr>
+            <a:picLocks noGrp="1" noChangeAspect="1"/>
+          </p:cNvPicPr>
+          <p:nvPr>
+            <p:ph idx="1"/>
+          </p:nvPr>
+        </p:nvPicPr>
+        <p:blipFill>
+          <a:blip r:embed="rId2">
+            <a:extLst>
+              <a:ext uri="{28A0092B-C50C-407E-A947-70E740481C1C}">
+                <a14:useLocalDpi xmlns:a14="http://schemas.microsoft.com/office/drawing/2010/main" val="0"/>
+              </a:ext>
+            </a:extLst>
+          </a:blip>
+          <a:stretch>
+            <a:fillRect/>
+          </a:stretch>
+        </p:blipFill>
+        <p:spPr>
+          <a:xfrm>
+            <a:off x="2369814" y="1340220"/>
+            <a:ext cx="7503235" cy="4908180"/>
+          </a:xfrm>
+        </p:spPr>
+      </p:pic>
       <p:sp>
         <p:nvSpPr>
           <p:cNvPr id="4" name="Dia számának helye 3"/>
@@ -12402,6 +12468,284 @@
             <a:fld id="{8BE30FF7-D81D-4675-9215-2C0768A00C33}" type="slidenum">
               <a:rPr lang="hu-HU" smtClean="0"/>
               <a:t>10</a:t>
+            </a:fld>
+            <a:endParaRPr lang="hu-HU"/>
+          </a:p>
+        </p:txBody>
+      </p:sp>
+    </p:spTree>
+    <p:extLst>
+      <p:ext uri="{BB962C8B-B14F-4D97-AF65-F5344CB8AC3E}">
+        <p14:creationId xmlns:p14="http://schemas.microsoft.com/office/powerpoint/2010/main" val="2905165118"/>
+      </p:ext>
+    </p:extLst>
+  </p:cSld>
+  <p:clrMapOvr>
+    <a:masterClrMapping/>
+  </p:clrMapOvr>
+</p:sld>
+</file>
+
+<file path=ppt/slides/slide11.xml><?xml version="1.0" encoding="utf-8"?>
+<p:sld xmlns:a="http://schemas.openxmlformats.org/drawingml/2006/main" xmlns:r="http://schemas.openxmlformats.org/officeDocument/2006/relationships" xmlns:p="http://schemas.openxmlformats.org/presentationml/2006/main">
+  <p:cSld>
+    <p:spTree>
+      <p:nvGrpSpPr>
+        <p:cNvPr id="1" name=""/>
+        <p:cNvGrpSpPr/>
+        <p:nvPr/>
+      </p:nvGrpSpPr>
+      <p:grpSpPr>
+        <a:xfrm>
+          <a:off x="0" y="0"/>
+          <a:ext cx="0" cy="0"/>
+          <a:chOff x="0" y="0"/>
+          <a:chExt cx="0" cy="0"/>
+        </a:xfrm>
+      </p:grpSpPr>
+      <p:sp>
+        <p:nvSpPr>
+          <p:cNvPr id="2" name="Cím 1"/>
+          <p:cNvSpPr>
+            <a:spLocks noGrp="1"/>
+          </p:cNvSpPr>
+          <p:nvPr>
+            <p:ph type="title"/>
+          </p:nvPr>
+        </p:nvSpPr>
+        <p:spPr/>
+        <p:txBody>
+          <a:bodyPr/>
+          <a:lstStyle/>
+          <a:p>
+            <a:r>
+              <a:rPr lang="hu-HU" dirty="0" smtClean="0"/>
+              <a:t>Technológiák</a:t>
+            </a:r>
+            <a:endParaRPr lang="hu-HU" dirty="0"/>
+          </a:p>
+        </p:txBody>
+      </p:sp>
+      <p:sp>
+        <p:nvSpPr>
+          <p:cNvPr id="3" name="Tartalom helye 2"/>
+          <p:cNvSpPr>
+            <a:spLocks noGrp="1"/>
+          </p:cNvSpPr>
+          <p:nvPr>
+            <p:ph idx="1"/>
+          </p:nvPr>
+        </p:nvSpPr>
+        <p:spPr/>
+        <p:txBody>
+          <a:bodyPr anchor="ctr"/>
+          <a:lstStyle/>
+          <a:p>
+            <a:pPr>
+              <a:buFont typeface="Arial" panose="020B0604020202020204" pitchFamily="34" charset="0"/>
+              <a:buChar char="•"/>
+            </a:pPr>
+            <a:r>
+              <a:rPr lang="hu-HU" dirty="0" err="1" smtClean="0"/>
+              <a:t>Postgres</a:t>
+            </a:r>
+            <a:r>
+              <a:rPr lang="hu-HU" dirty="0" smtClean="0"/>
+              <a:t> adatbázis-kezelő rendszer</a:t>
+            </a:r>
+            <a:br>
+              <a:rPr lang="hu-HU" dirty="0" smtClean="0"/>
+            </a:br>
+            <a:endParaRPr lang="hu-HU" dirty="0" smtClean="0"/>
+          </a:p>
+          <a:p>
+            <a:pPr>
+              <a:buFont typeface="Arial" panose="020B0604020202020204" pitchFamily="34" charset="0"/>
+              <a:buChar char="•"/>
+            </a:pPr>
+            <a:r>
+              <a:rPr lang="hu-HU" dirty="0" smtClean="0"/>
+              <a:t>Java programozási nyelv</a:t>
+            </a:r>
+            <a:br>
+              <a:rPr lang="hu-HU" dirty="0" smtClean="0"/>
+            </a:br>
+            <a:endParaRPr lang="hu-HU" dirty="0" smtClean="0"/>
+          </a:p>
+          <a:p>
+            <a:pPr lvl="1">
+              <a:buFont typeface="Arial" panose="020B0604020202020204" pitchFamily="34" charset="0"/>
+              <a:buChar char="•"/>
+            </a:pPr>
+            <a:r>
+              <a:rPr lang="hu-HU" dirty="0" smtClean="0"/>
+              <a:t>JDBC (Java </a:t>
+            </a:r>
+            <a:r>
+              <a:rPr lang="hu-HU" dirty="0" err="1" smtClean="0"/>
+              <a:t>Database</a:t>
+            </a:r>
+            <a:r>
+              <a:rPr lang="hu-HU" dirty="0" smtClean="0"/>
+              <a:t> </a:t>
+            </a:r>
+            <a:r>
+              <a:rPr lang="hu-HU" dirty="0" err="1" smtClean="0"/>
+              <a:t>Connectivity</a:t>
+            </a:r>
+            <a:r>
+              <a:rPr lang="hu-HU" dirty="0" smtClean="0"/>
+              <a:t>)</a:t>
+            </a:r>
+            <a:br>
+              <a:rPr lang="hu-HU" dirty="0" smtClean="0"/>
+            </a:br>
+            <a:endParaRPr lang="hu-HU" dirty="0" smtClean="0"/>
+          </a:p>
+          <a:p>
+            <a:pPr lvl="1">
+              <a:buFont typeface="Arial" panose="020B0604020202020204" pitchFamily="34" charset="0"/>
+              <a:buChar char="•"/>
+            </a:pPr>
+            <a:r>
+              <a:rPr lang="hu-HU" dirty="0" err="1" smtClean="0"/>
+              <a:t>JavaFx</a:t>
+            </a:r>
+            <a:r>
+              <a:rPr lang="hu-HU" dirty="0" smtClean="0"/>
+              <a:t/>
+            </a:r>
+            <a:br>
+              <a:rPr lang="hu-HU" dirty="0" smtClean="0"/>
+            </a:br>
+            <a:endParaRPr lang="hu-HU" dirty="0" smtClean="0"/>
+          </a:p>
+          <a:p>
+            <a:pPr lvl="1">
+              <a:buFont typeface="Arial" panose="020B0604020202020204" pitchFamily="34" charset="0"/>
+              <a:buChar char="•"/>
+            </a:pPr>
+            <a:r>
+              <a:rPr lang="hu-HU" dirty="0" err="1" smtClean="0"/>
+              <a:t>Apache</a:t>
+            </a:r>
+            <a:r>
+              <a:rPr lang="hu-HU" dirty="0" smtClean="0"/>
+              <a:t> </a:t>
+            </a:r>
+            <a:r>
+              <a:rPr lang="hu-HU" dirty="0" err="1" smtClean="0"/>
+              <a:t>Commons</a:t>
+            </a:r>
+            <a:r>
+              <a:rPr lang="hu-HU" dirty="0" smtClean="0"/>
+              <a:t> IO</a:t>
+            </a:r>
+            <a:endParaRPr lang="hu-HU" dirty="0"/>
+          </a:p>
+        </p:txBody>
+      </p:sp>
+      <p:sp>
+        <p:nvSpPr>
+          <p:cNvPr id="4" name="Dia számának helye 3"/>
+          <p:cNvSpPr>
+            <a:spLocks noGrp="1"/>
+          </p:cNvSpPr>
+          <p:nvPr>
+            <p:ph type="sldNum" sz="quarter" idx="12"/>
+          </p:nvPr>
+        </p:nvSpPr>
+        <p:spPr/>
+        <p:txBody>
+          <a:bodyPr/>
+          <a:lstStyle/>
+          <a:p>
+            <a:fld id="{8BE30FF7-D81D-4675-9215-2C0768A00C33}" type="slidenum">
+              <a:rPr lang="hu-HU" smtClean="0"/>
+              <a:t>11</a:t>
+            </a:fld>
+            <a:endParaRPr lang="hu-HU"/>
+          </a:p>
+        </p:txBody>
+      </p:sp>
+    </p:spTree>
+    <p:extLst>
+      <p:ext uri="{BB962C8B-B14F-4D97-AF65-F5344CB8AC3E}">
+        <p14:creationId xmlns:p14="http://schemas.microsoft.com/office/powerpoint/2010/main" val="1956989532"/>
+      </p:ext>
+    </p:extLst>
+  </p:cSld>
+  <p:clrMapOvr>
+    <a:masterClrMapping/>
+  </p:clrMapOvr>
+  <p:timing>
+    <p:tnLst>
+      <p:par>
+        <p:cTn id="1" dur="indefinite" restart="never" nodeType="tmRoot"/>
+      </p:par>
+    </p:tnLst>
+  </p:timing>
+</p:sld>
+</file>
+
+<file path=ppt/slides/slide12.xml><?xml version="1.0" encoding="utf-8"?>
+<p:sld xmlns:a="http://schemas.openxmlformats.org/drawingml/2006/main" xmlns:r="http://schemas.openxmlformats.org/officeDocument/2006/relationships" xmlns:p="http://schemas.openxmlformats.org/presentationml/2006/main">
+  <p:cSld>
+    <p:spTree>
+      <p:nvGrpSpPr>
+        <p:cNvPr id="1" name=""/>
+        <p:cNvGrpSpPr/>
+        <p:nvPr/>
+      </p:nvGrpSpPr>
+      <p:grpSpPr>
+        <a:xfrm>
+          <a:off x="0" y="0"/>
+          <a:ext cx="0" cy="0"/>
+          <a:chOff x="0" y="0"/>
+          <a:chExt cx="0" cy="0"/>
+        </a:xfrm>
+      </p:grpSpPr>
+      <p:sp>
+        <p:nvSpPr>
+          <p:cNvPr id="2" name="Cím 1"/>
+          <p:cNvSpPr>
+            <a:spLocks noGrp="1"/>
+          </p:cNvSpPr>
+          <p:nvPr>
+            <p:ph type="title"/>
+          </p:nvPr>
+        </p:nvSpPr>
+        <p:spPr/>
+        <p:txBody>
+          <a:bodyPr/>
+          <a:lstStyle/>
+          <a:p>
+            <a:r>
+              <a:rPr lang="hu-HU" dirty="0" smtClean="0"/>
+              <a:t>Köszönöm a figyelmet!</a:t>
+            </a:r>
+            <a:endParaRPr lang="hu-HU" dirty="0"/>
+          </a:p>
+        </p:txBody>
+      </p:sp>
+      <p:sp>
+        <p:nvSpPr>
+          <p:cNvPr id="4" name="Dia számának helye 3"/>
+          <p:cNvSpPr>
+            <a:spLocks noGrp="1"/>
+          </p:cNvSpPr>
+          <p:nvPr>
+            <p:ph type="sldNum" sz="quarter" idx="12"/>
+          </p:nvPr>
+        </p:nvSpPr>
+        <p:spPr/>
+        <p:txBody>
+          <a:bodyPr/>
+          <a:lstStyle/>
+          <a:p>
+            <a:fld id="{8BE30FF7-D81D-4675-9215-2C0768A00C33}" type="slidenum">
+              <a:rPr lang="hu-HU" smtClean="0"/>
+              <a:t>12</a:t>
             </a:fld>
             <a:endParaRPr lang="hu-HU"/>
           </a:p>
@@ -12544,6 +12888,24 @@
             </a:pPr>
             <a:r>
               <a:rPr lang="hu-HU" dirty="0" smtClean="0"/>
+              <a:t>Adatmodell</a:t>
+            </a:r>
+            <a:r>
+              <a:rPr lang="hu-HU" dirty="0" smtClean="0"/>
+              <a:t/>
+            </a:r>
+            <a:br>
+              <a:rPr lang="hu-HU" dirty="0" smtClean="0"/>
+            </a:br>
+            <a:endParaRPr lang="hu-HU" dirty="0" smtClean="0"/>
+          </a:p>
+          <a:p>
+            <a:pPr>
+              <a:buFont typeface="Arial" panose="020B0604020202020204" pitchFamily="34" charset="0"/>
+              <a:buChar char="•"/>
+            </a:pPr>
+            <a:r>
+              <a:rPr lang="hu-HU" dirty="0" smtClean="0"/>
               <a:t>Technológiák</a:t>
             </a:r>
             <a:endParaRPr lang="hu-HU" dirty="0"/>
@@ -12678,11 +13040,7 @@
             </a:pPr>
             <a:r>
               <a:rPr lang="hu-HU" dirty="0" smtClean="0"/>
-              <a:t>Villamosmérnöki- </a:t>
-            </a:r>
-            <a:r>
-              <a:rPr lang="hu-HU" dirty="0" smtClean="0"/>
-              <a:t>és Informatikai Rendszerek tanszéken fejlesztett szoftver</a:t>
+              <a:t>Villamosmérnöki- és Informatikai Rendszerek tanszéken fejlesztett szoftver</a:t>
             </a:r>
             <a:br>
               <a:rPr lang="hu-HU" dirty="0" smtClean="0"/>
@@ -13074,90 +13432,7 @@
           <a:p>
             <a:r>
               <a:rPr lang="hu-HU" dirty="0" smtClean="0"/>
-              <a:t>Specifikáció</a:t>
-            </a:r>
-            <a:endParaRPr lang="hu-HU" dirty="0"/>
-          </a:p>
-        </p:txBody>
-      </p:sp>
-      <p:sp>
-        <p:nvSpPr>
-          <p:cNvPr id="3" name="Tartalom helye 2"/>
-          <p:cNvSpPr>
-            <a:spLocks noGrp="1"/>
-          </p:cNvSpPr>
-          <p:nvPr>
-            <p:ph idx="1"/>
-          </p:nvPr>
-        </p:nvSpPr>
-        <p:spPr/>
-        <p:txBody>
-          <a:bodyPr anchor="ctr"/>
-          <a:lstStyle/>
-          <a:p>
-            <a:pPr>
-              <a:buFont typeface="Arial" panose="020B0604020202020204" pitchFamily="34" charset="0"/>
-              <a:buChar char="•"/>
-            </a:pPr>
-            <a:r>
-              <a:rPr lang="hu-HU" dirty="0" smtClean="0"/>
-              <a:t>Változásokat tartalmazó fájlok felhasználása</a:t>
-            </a:r>
-            <a:br>
-              <a:rPr lang="hu-HU" dirty="0" smtClean="0"/>
-            </a:br>
-            <a:endParaRPr lang="hu-HU" dirty="0" smtClean="0"/>
-          </a:p>
-          <a:p>
-            <a:pPr>
-              <a:buFont typeface="Arial" panose="020B0604020202020204" pitchFamily="34" charset="0"/>
-              <a:buChar char="•"/>
-            </a:pPr>
-            <a:r>
-              <a:rPr lang="hu-HU" dirty="0" smtClean="0"/>
-              <a:t>Grafikus felhasználói felület</a:t>
-            </a:r>
-            <a:br>
-              <a:rPr lang="hu-HU" dirty="0" smtClean="0"/>
-            </a:br>
-            <a:endParaRPr lang="hu-HU" dirty="0" smtClean="0"/>
-          </a:p>
-          <a:p>
-            <a:pPr>
-              <a:buFont typeface="Arial" panose="020B0604020202020204" pitchFamily="34" charset="0"/>
-              <a:buChar char="•"/>
-            </a:pPr>
-            <a:r>
-              <a:rPr lang="hu-HU" dirty="0" smtClean="0"/>
-              <a:t>Adatbázis oldali tárolt eljárások</a:t>
-            </a:r>
-            <a:br>
-              <a:rPr lang="hu-HU" dirty="0" smtClean="0"/>
-            </a:br>
-            <a:endParaRPr lang="hu-HU" dirty="0" smtClean="0"/>
-          </a:p>
-          <a:p>
-            <a:pPr>
-              <a:buFont typeface="Arial" panose="020B0604020202020204" pitchFamily="34" charset="0"/>
-              <a:buChar char="•"/>
-            </a:pPr>
-            <a:r>
-              <a:rPr lang="hu-HU" dirty="0" smtClean="0"/>
-              <a:t>Folyamat naplózása</a:t>
-            </a:r>
-            <a:br>
-              <a:rPr lang="hu-HU" dirty="0" smtClean="0"/>
-            </a:br>
-            <a:endParaRPr lang="hu-HU" dirty="0" smtClean="0"/>
-          </a:p>
-          <a:p>
-            <a:pPr>
-              <a:buFont typeface="Arial" panose="020B0604020202020204" pitchFamily="34" charset="0"/>
-              <a:buChar char="•"/>
-            </a:pPr>
-            <a:r>
-              <a:rPr lang="hu-HU" dirty="0" smtClean="0"/>
-              <a:t>Adatbázis visszaállítása</a:t>
+              <a:t>Feladat ismertetése</a:t>
             </a:r>
             <a:endParaRPr lang="hu-HU" dirty="0"/>
           </a:p>
@@ -13186,23 +13461,713 @@
           </a:p>
         </p:txBody>
       </p:sp>
+      <p:sp>
+        <p:nvSpPr>
+          <p:cNvPr id="5" name="Ellipszis 4"/>
+          <p:cNvSpPr/>
+          <p:nvPr/>
+        </p:nvSpPr>
+        <p:spPr>
+          <a:xfrm>
+            <a:off x="1821235" y="2533135"/>
+            <a:ext cx="2051222" cy="667265"/>
+          </a:xfrm>
+          <a:prstGeom prst="ellipse">
+            <a:avLst/>
+          </a:prstGeom>
+        </p:spPr>
+        <p:style>
+          <a:lnRef idx="2">
+            <a:schemeClr val="accent1">
+              <a:shade val="50000"/>
+            </a:schemeClr>
+          </a:lnRef>
+          <a:fillRef idx="1">
+            <a:schemeClr val="accent1"/>
+          </a:fillRef>
+          <a:effectRef idx="0">
+            <a:schemeClr val="accent1"/>
+          </a:effectRef>
+          <a:fontRef idx="minor">
+            <a:schemeClr val="lt1"/>
+          </a:fontRef>
+        </p:style>
+        <p:txBody>
+          <a:bodyPr rtlCol="0" anchor="ctr"/>
+          <a:lstStyle/>
+          <a:p>
+            <a:pPr algn="ctr"/>
+            <a:endParaRPr lang="hu-HU"/>
+          </a:p>
+        </p:txBody>
+      </p:sp>
+      <p:cxnSp>
+        <p:nvCxnSpPr>
+          <p:cNvPr id="7" name="Szögletes összekötő 6"/>
+          <p:cNvCxnSpPr>
+            <a:stCxn id="5" idx="6"/>
+          </p:cNvCxnSpPr>
+          <p:nvPr/>
+        </p:nvCxnSpPr>
+        <p:spPr>
+          <a:xfrm>
+            <a:off x="3872457" y="2866768"/>
+            <a:ext cx="1186249" cy="954740"/>
+          </a:xfrm>
+          <a:prstGeom prst="bentConnector3">
+            <a:avLst/>
+          </a:prstGeom>
+          <a:ln w="57150">
+            <a:tailEnd type="triangle"/>
+          </a:ln>
+        </p:spPr>
+        <p:style>
+          <a:lnRef idx="1">
+            <a:schemeClr val="accent1"/>
+          </a:lnRef>
+          <a:fillRef idx="0">
+            <a:schemeClr val="accent1"/>
+          </a:fillRef>
+          <a:effectRef idx="0">
+            <a:schemeClr val="accent1"/>
+          </a:effectRef>
+          <a:fontRef idx="minor">
+            <a:schemeClr val="tx1"/>
+          </a:fontRef>
+        </p:style>
+      </p:cxnSp>
+      <p:sp>
+        <p:nvSpPr>
+          <p:cNvPr id="9" name="Ellipszis 8"/>
+          <p:cNvSpPr/>
+          <p:nvPr/>
+        </p:nvSpPr>
+        <p:spPr>
+          <a:xfrm>
+            <a:off x="1821235" y="3487876"/>
+            <a:ext cx="2051222" cy="667265"/>
+          </a:xfrm>
+          <a:prstGeom prst="ellipse">
+            <a:avLst/>
+          </a:prstGeom>
+        </p:spPr>
+        <p:style>
+          <a:lnRef idx="2">
+            <a:schemeClr val="accent1">
+              <a:shade val="50000"/>
+            </a:schemeClr>
+          </a:lnRef>
+          <a:fillRef idx="1">
+            <a:schemeClr val="accent1"/>
+          </a:fillRef>
+          <a:effectRef idx="0">
+            <a:schemeClr val="accent1"/>
+          </a:effectRef>
+          <a:fontRef idx="minor">
+            <a:schemeClr val="lt1"/>
+          </a:fontRef>
+        </p:style>
+        <p:txBody>
+          <a:bodyPr rtlCol="0" anchor="ctr"/>
+          <a:lstStyle/>
+          <a:p>
+            <a:pPr algn="ctr"/>
+            <a:endParaRPr lang="hu-HU"/>
+          </a:p>
+        </p:txBody>
+      </p:sp>
+      <p:sp>
+        <p:nvSpPr>
+          <p:cNvPr id="10" name="Ellipszis 9"/>
+          <p:cNvSpPr/>
+          <p:nvPr/>
+        </p:nvSpPr>
+        <p:spPr>
+          <a:xfrm>
+            <a:off x="1821235" y="4442617"/>
+            <a:ext cx="2051222" cy="667265"/>
+          </a:xfrm>
+          <a:prstGeom prst="ellipse">
+            <a:avLst/>
+          </a:prstGeom>
+        </p:spPr>
+        <p:style>
+          <a:lnRef idx="2">
+            <a:schemeClr val="accent1">
+              <a:shade val="50000"/>
+            </a:schemeClr>
+          </a:lnRef>
+          <a:fillRef idx="1">
+            <a:schemeClr val="accent1"/>
+          </a:fillRef>
+          <a:effectRef idx="0">
+            <a:schemeClr val="accent1"/>
+          </a:effectRef>
+          <a:fontRef idx="minor">
+            <a:schemeClr val="lt1"/>
+          </a:fontRef>
+        </p:style>
+        <p:txBody>
+          <a:bodyPr rtlCol="0" anchor="ctr"/>
+          <a:lstStyle/>
+          <a:p>
+            <a:pPr algn="ctr"/>
+            <a:endParaRPr lang="hu-HU"/>
+          </a:p>
+        </p:txBody>
+      </p:sp>
+      <p:cxnSp>
+        <p:nvCxnSpPr>
+          <p:cNvPr id="13" name="Egyenes összekötő 12"/>
+          <p:cNvCxnSpPr/>
+          <p:nvPr/>
+        </p:nvCxnSpPr>
+        <p:spPr>
+          <a:xfrm>
+            <a:off x="3872457" y="3821508"/>
+            <a:ext cx="778476" cy="0"/>
+          </a:xfrm>
+          <a:prstGeom prst="line">
+            <a:avLst/>
+          </a:prstGeom>
+          <a:ln w="57150"/>
+        </p:spPr>
+        <p:style>
+          <a:lnRef idx="1">
+            <a:schemeClr val="accent1"/>
+          </a:lnRef>
+          <a:fillRef idx="0">
+            <a:schemeClr val="accent1"/>
+          </a:fillRef>
+          <a:effectRef idx="0">
+            <a:schemeClr val="accent1"/>
+          </a:effectRef>
+          <a:fontRef idx="minor">
+            <a:schemeClr val="tx1"/>
+          </a:fontRef>
+        </p:style>
+      </p:cxnSp>
+      <p:cxnSp>
+        <p:nvCxnSpPr>
+          <p:cNvPr id="16" name="Szögletes összekötő 15"/>
+          <p:cNvCxnSpPr>
+            <a:stCxn id="10" idx="6"/>
+          </p:cNvCxnSpPr>
+          <p:nvPr/>
+        </p:nvCxnSpPr>
+        <p:spPr>
+          <a:xfrm flipV="1">
+            <a:off x="3872457" y="3821508"/>
+            <a:ext cx="593124" cy="954742"/>
+          </a:xfrm>
+          <a:prstGeom prst="bentConnector2">
+            <a:avLst/>
+          </a:prstGeom>
+          <a:ln w="57150"/>
+        </p:spPr>
+        <p:style>
+          <a:lnRef idx="1">
+            <a:schemeClr val="accent1"/>
+          </a:lnRef>
+          <a:fillRef idx="0">
+            <a:schemeClr val="accent1"/>
+          </a:fillRef>
+          <a:effectRef idx="0">
+            <a:schemeClr val="accent1"/>
+          </a:effectRef>
+          <a:fontRef idx="minor">
+            <a:schemeClr val="tx1"/>
+          </a:fontRef>
+        </p:style>
+      </p:cxnSp>
+      <p:sp>
+        <p:nvSpPr>
+          <p:cNvPr id="17" name="Lekerekített téglalap 16"/>
+          <p:cNvSpPr/>
+          <p:nvPr/>
+        </p:nvSpPr>
+        <p:spPr>
+          <a:xfrm>
+            <a:off x="5058706" y="3364308"/>
+            <a:ext cx="1643449" cy="914400"/>
+          </a:xfrm>
+          <a:prstGeom prst="roundRect">
+            <a:avLst/>
+          </a:prstGeom>
+        </p:spPr>
+        <p:style>
+          <a:lnRef idx="2">
+            <a:schemeClr val="accent1">
+              <a:shade val="50000"/>
+            </a:schemeClr>
+          </a:lnRef>
+          <a:fillRef idx="1">
+            <a:schemeClr val="accent1"/>
+          </a:fillRef>
+          <a:effectRef idx="0">
+            <a:schemeClr val="accent1"/>
+          </a:effectRef>
+          <a:fontRef idx="minor">
+            <a:schemeClr val="lt1"/>
+          </a:fontRef>
+        </p:style>
+        <p:txBody>
+          <a:bodyPr rtlCol="0" anchor="ctr"/>
+          <a:lstStyle/>
+          <a:p>
+            <a:pPr algn="ctr"/>
+            <a:endParaRPr lang="hu-HU"/>
+          </a:p>
+        </p:txBody>
+      </p:sp>
+      <p:sp>
+        <p:nvSpPr>
+          <p:cNvPr id="18" name="Folyamatábra: Feldolgozás 17"/>
+          <p:cNvSpPr/>
+          <p:nvPr/>
+        </p:nvSpPr>
+        <p:spPr>
+          <a:xfrm>
+            <a:off x="8036683" y="2533135"/>
+            <a:ext cx="2014151" cy="667265"/>
+          </a:xfrm>
+          <a:prstGeom prst="flowChartProcess">
+            <a:avLst/>
+          </a:prstGeom>
+        </p:spPr>
+        <p:style>
+          <a:lnRef idx="2">
+            <a:schemeClr val="accent1">
+              <a:shade val="50000"/>
+            </a:schemeClr>
+          </a:lnRef>
+          <a:fillRef idx="1">
+            <a:schemeClr val="accent1"/>
+          </a:fillRef>
+          <a:effectRef idx="0">
+            <a:schemeClr val="accent1"/>
+          </a:effectRef>
+          <a:fontRef idx="minor">
+            <a:schemeClr val="lt1"/>
+          </a:fontRef>
+        </p:style>
+        <p:txBody>
+          <a:bodyPr rtlCol="0" anchor="ctr"/>
+          <a:lstStyle/>
+          <a:p>
+            <a:pPr algn="ctr"/>
+            <a:endParaRPr lang="hu-HU"/>
+          </a:p>
+        </p:txBody>
+      </p:sp>
+      <p:sp>
+        <p:nvSpPr>
+          <p:cNvPr id="19" name="Folyamatábra: Feldolgozás 18"/>
+          <p:cNvSpPr/>
+          <p:nvPr/>
+        </p:nvSpPr>
+        <p:spPr>
+          <a:xfrm>
+            <a:off x="8036683" y="3487875"/>
+            <a:ext cx="2014151" cy="667265"/>
+          </a:xfrm>
+          <a:prstGeom prst="flowChartProcess">
+            <a:avLst/>
+          </a:prstGeom>
+        </p:spPr>
+        <p:style>
+          <a:lnRef idx="2">
+            <a:schemeClr val="accent1">
+              <a:shade val="50000"/>
+            </a:schemeClr>
+          </a:lnRef>
+          <a:fillRef idx="1">
+            <a:schemeClr val="accent1"/>
+          </a:fillRef>
+          <a:effectRef idx="0">
+            <a:schemeClr val="accent1"/>
+          </a:effectRef>
+          <a:fontRef idx="minor">
+            <a:schemeClr val="lt1"/>
+          </a:fontRef>
+        </p:style>
+        <p:txBody>
+          <a:bodyPr rtlCol="0" anchor="ctr"/>
+          <a:lstStyle/>
+          <a:p>
+            <a:pPr algn="ctr"/>
+            <a:endParaRPr lang="hu-HU"/>
+          </a:p>
+        </p:txBody>
+      </p:sp>
+      <p:sp>
+        <p:nvSpPr>
+          <p:cNvPr id="20" name="Folyamatábra: Feldolgozás 19"/>
+          <p:cNvSpPr/>
+          <p:nvPr/>
+        </p:nvSpPr>
+        <p:spPr>
+          <a:xfrm>
+            <a:off x="8036683" y="4442617"/>
+            <a:ext cx="2014151" cy="667265"/>
+          </a:xfrm>
+          <a:prstGeom prst="flowChartProcess">
+            <a:avLst/>
+          </a:prstGeom>
+        </p:spPr>
+        <p:style>
+          <a:lnRef idx="2">
+            <a:schemeClr val="accent1">
+              <a:shade val="50000"/>
+            </a:schemeClr>
+          </a:lnRef>
+          <a:fillRef idx="1">
+            <a:schemeClr val="accent1"/>
+          </a:fillRef>
+          <a:effectRef idx="0">
+            <a:schemeClr val="accent1"/>
+          </a:effectRef>
+          <a:fontRef idx="minor">
+            <a:schemeClr val="lt1"/>
+          </a:fontRef>
+        </p:style>
+        <p:txBody>
+          <a:bodyPr rtlCol="0" anchor="ctr"/>
+          <a:lstStyle/>
+          <a:p>
+            <a:pPr algn="ctr"/>
+            <a:endParaRPr lang="hu-HU"/>
+          </a:p>
+        </p:txBody>
+      </p:sp>
+      <p:cxnSp>
+        <p:nvCxnSpPr>
+          <p:cNvPr id="22" name="Szögletes összekötő 21"/>
+          <p:cNvCxnSpPr>
+            <a:stCxn id="17" idx="3"/>
+            <a:endCxn id="18" idx="1"/>
+          </p:cNvCxnSpPr>
+          <p:nvPr/>
+        </p:nvCxnSpPr>
+        <p:spPr>
+          <a:xfrm flipV="1">
+            <a:off x="6702155" y="2866768"/>
+            <a:ext cx="1334528" cy="954740"/>
+          </a:xfrm>
+          <a:prstGeom prst="bentConnector3">
+            <a:avLst/>
+          </a:prstGeom>
+          <a:ln w="57150">
+            <a:tailEnd type="triangle"/>
+          </a:ln>
+        </p:spPr>
+        <p:style>
+          <a:lnRef idx="1">
+            <a:schemeClr val="accent1"/>
+          </a:lnRef>
+          <a:fillRef idx="0">
+            <a:schemeClr val="accent1"/>
+          </a:fillRef>
+          <a:effectRef idx="0">
+            <a:schemeClr val="accent1"/>
+          </a:effectRef>
+          <a:fontRef idx="minor">
+            <a:schemeClr val="tx1"/>
+          </a:fontRef>
+        </p:style>
+      </p:cxnSp>
+      <p:cxnSp>
+        <p:nvCxnSpPr>
+          <p:cNvPr id="24" name="Szögletes összekötő 23"/>
+          <p:cNvCxnSpPr>
+            <a:stCxn id="17" idx="3"/>
+            <a:endCxn id="19" idx="1"/>
+          </p:cNvCxnSpPr>
+          <p:nvPr/>
+        </p:nvCxnSpPr>
+        <p:spPr>
+          <a:xfrm>
+            <a:off x="6702155" y="3821508"/>
+            <a:ext cx="1334528" cy="12700"/>
+          </a:xfrm>
+          <a:prstGeom prst="bentConnector3">
+            <a:avLst/>
+          </a:prstGeom>
+          <a:ln w="57150">
+            <a:tailEnd type="triangle"/>
+          </a:ln>
+        </p:spPr>
+        <p:style>
+          <a:lnRef idx="1">
+            <a:schemeClr val="accent1"/>
+          </a:lnRef>
+          <a:fillRef idx="0">
+            <a:schemeClr val="accent1"/>
+          </a:fillRef>
+          <a:effectRef idx="0">
+            <a:schemeClr val="accent1"/>
+          </a:effectRef>
+          <a:fontRef idx="minor">
+            <a:schemeClr val="tx1"/>
+          </a:fontRef>
+        </p:style>
+      </p:cxnSp>
+      <p:cxnSp>
+        <p:nvCxnSpPr>
+          <p:cNvPr id="26" name="Szögletes összekötő 25"/>
+          <p:cNvCxnSpPr>
+            <a:stCxn id="17" idx="3"/>
+            <a:endCxn id="20" idx="1"/>
+          </p:cNvCxnSpPr>
+          <p:nvPr/>
+        </p:nvCxnSpPr>
+        <p:spPr>
+          <a:xfrm>
+            <a:off x="6702155" y="3821508"/>
+            <a:ext cx="1334528" cy="954742"/>
+          </a:xfrm>
+          <a:prstGeom prst="bentConnector3">
+            <a:avLst/>
+          </a:prstGeom>
+          <a:ln w="57150">
+            <a:tailEnd type="triangle"/>
+          </a:ln>
+        </p:spPr>
+        <p:style>
+          <a:lnRef idx="1">
+            <a:schemeClr val="accent1"/>
+          </a:lnRef>
+          <a:fillRef idx="0">
+            <a:schemeClr val="accent1"/>
+          </a:fillRef>
+          <a:effectRef idx="0">
+            <a:schemeClr val="accent1"/>
+          </a:effectRef>
+          <a:fontRef idx="minor">
+            <a:schemeClr val="tx1"/>
+          </a:fontRef>
+        </p:style>
+      </p:cxnSp>
+      <p:sp>
+        <p:nvSpPr>
+          <p:cNvPr id="28" name="Szövegdoboz 27"/>
+          <p:cNvSpPr txBox="1"/>
+          <p:nvPr/>
+        </p:nvSpPr>
+        <p:spPr>
+          <a:xfrm>
+            <a:off x="2523650" y="2682101"/>
+            <a:ext cx="718771" cy="369332"/>
+          </a:xfrm>
+          <a:prstGeom prst="rect">
+            <a:avLst/>
+          </a:prstGeom>
+          <a:noFill/>
+        </p:spPr>
+        <p:txBody>
+          <a:bodyPr wrap="square" rtlCol="0">
+            <a:spAutoFit/>
+          </a:bodyPr>
+          <a:lstStyle/>
+          <a:p>
+            <a:r>
+              <a:rPr lang="hu-HU" dirty="0" smtClean="0"/>
+              <a:t>ADD</a:t>
+            </a:r>
+            <a:endParaRPr lang="hu-HU" dirty="0"/>
+          </a:p>
+        </p:txBody>
+      </p:sp>
+      <p:sp>
+        <p:nvSpPr>
+          <p:cNvPr id="29" name="Szövegdoboz 28"/>
+          <p:cNvSpPr txBox="1"/>
+          <p:nvPr/>
+        </p:nvSpPr>
+        <p:spPr>
+          <a:xfrm>
+            <a:off x="2229008" y="3636841"/>
+            <a:ext cx="1228113" cy="369332"/>
+          </a:xfrm>
+          <a:prstGeom prst="rect">
+            <a:avLst/>
+          </a:prstGeom>
+          <a:noFill/>
+        </p:spPr>
+        <p:txBody>
+          <a:bodyPr wrap="square" rtlCol="0">
+            <a:spAutoFit/>
+          </a:bodyPr>
+          <a:lstStyle/>
+          <a:p>
+            <a:r>
+              <a:rPr lang="hu-HU" dirty="0" smtClean="0"/>
+              <a:t>CHANGE</a:t>
+            </a:r>
+            <a:endParaRPr lang="hu-HU" dirty="0"/>
+          </a:p>
+        </p:txBody>
+      </p:sp>
+      <p:sp>
+        <p:nvSpPr>
+          <p:cNvPr id="30" name="Szövegdoboz 29"/>
+          <p:cNvSpPr txBox="1"/>
+          <p:nvPr/>
+        </p:nvSpPr>
+        <p:spPr>
+          <a:xfrm>
+            <a:off x="2408182" y="4591583"/>
+            <a:ext cx="1048939" cy="369332"/>
+          </a:xfrm>
+          <a:prstGeom prst="rect">
+            <a:avLst/>
+          </a:prstGeom>
+          <a:noFill/>
+        </p:spPr>
+        <p:txBody>
+          <a:bodyPr wrap="square" rtlCol="0">
+            <a:spAutoFit/>
+          </a:bodyPr>
+          <a:lstStyle/>
+          <a:p>
+            <a:r>
+              <a:rPr lang="hu-HU" dirty="0" smtClean="0"/>
+              <a:t>DELETE</a:t>
+            </a:r>
+            <a:endParaRPr lang="hu-HU" dirty="0"/>
+          </a:p>
+        </p:txBody>
+      </p:sp>
+      <p:sp>
+        <p:nvSpPr>
+          <p:cNvPr id="31" name="Szövegdoboz 30"/>
+          <p:cNvSpPr txBox="1"/>
+          <p:nvPr/>
+        </p:nvSpPr>
+        <p:spPr>
+          <a:xfrm>
+            <a:off x="5192738" y="3636841"/>
+            <a:ext cx="1375384" cy="369332"/>
+          </a:xfrm>
+          <a:prstGeom prst="rect">
+            <a:avLst/>
+          </a:prstGeom>
+          <a:noFill/>
+        </p:spPr>
+        <p:txBody>
+          <a:bodyPr wrap="square" rtlCol="0">
+            <a:spAutoFit/>
+          </a:bodyPr>
+          <a:lstStyle/>
+          <a:p>
+            <a:r>
+              <a:rPr lang="hu-HU" dirty="0" smtClean="0"/>
+              <a:t>SOFTWARE</a:t>
+            </a:r>
+            <a:endParaRPr lang="hu-HU" dirty="0"/>
+          </a:p>
+        </p:txBody>
+      </p:sp>
+      <p:sp>
+        <p:nvSpPr>
+          <p:cNvPr id="32" name="Szövegdoboz 31"/>
+          <p:cNvSpPr txBox="1"/>
+          <p:nvPr/>
+        </p:nvSpPr>
+        <p:spPr>
+          <a:xfrm>
+            <a:off x="8577985" y="2682101"/>
+            <a:ext cx="931546" cy="369332"/>
+          </a:xfrm>
+          <a:prstGeom prst="rect">
+            <a:avLst/>
+          </a:prstGeom>
+          <a:noFill/>
+        </p:spPr>
+        <p:txBody>
+          <a:bodyPr wrap="square" rtlCol="0">
+            <a:spAutoFit/>
+          </a:bodyPr>
+          <a:lstStyle/>
+          <a:p>
+            <a:r>
+              <a:rPr lang="hu-HU" dirty="0" smtClean="0"/>
+              <a:t>FOOD</a:t>
+            </a:r>
+            <a:endParaRPr lang="hu-HU" dirty="0"/>
+          </a:p>
+        </p:txBody>
+      </p:sp>
+      <p:sp>
+        <p:nvSpPr>
+          <p:cNvPr id="33" name="Szövegdoboz 32"/>
+          <p:cNvSpPr txBox="1"/>
+          <p:nvPr/>
+        </p:nvSpPr>
+        <p:spPr>
+          <a:xfrm>
+            <a:off x="8051462" y="3636841"/>
+            <a:ext cx="1999372" cy="369332"/>
+          </a:xfrm>
+          <a:prstGeom prst="rect">
+            <a:avLst/>
+          </a:prstGeom>
+          <a:noFill/>
+        </p:spPr>
+        <p:txBody>
+          <a:bodyPr wrap="square" rtlCol="0">
+            <a:spAutoFit/>
+          </a:bodyPr>
+          <a:lstStyle/>
+          <a:p>
+            <a:r>
+              <a:rPr lang="hu-HU" dirty="0" smtClean="0"/>
+              <a:t>FOOD CONTENT</a:t>
+            </a:r>
+            <a:endParaRPr lang="hu-HU" dirty="0"/>
+          </a:p>
+        </p:txBody>
+      </p:sp>
+      <p:sp>
+        <p:nvSpPr>
+          <p:cNvPr id="34" name="Szövegdoboz 33"/>
+          <p:cNvSpPr txBox="1"/>
+          <p:nvPr/>
+        </p:nvSpPr>
+        <p:spPr>
+          <a:xfrm>
+            <a:off x="8853426" y="4591583"/>
+            <a:ext cx="380664" cy="369332"/>
+          </a:xfrm>
+          <a:prstGeom prst="rect">
+            <a:avLst/>
+          </a:prstGeom>
+          <a:noFill/>
+        </p:spPr>
+        <p:txBody>
+          <a:bodyPr wrap="square" rtlCol="0">
+            <a:spAutoFit/>
+          </a:bodyPr>
+          <a:lstStyle/>
+          <a:p>
+            <a:r>
+              <a:rPr lang="hu-HU" dirty="0" smtClean="0"/>
+              <a:t>…</a:t>
+            </a:r>
+            <a:endParaRPr lang="hu-HU" dirty="0"/>
+          </a:p>
+        </p:txBody>
+      </p:sp>
     </p:spTree>
     <p:extLst>
       <p:ext uri="{BB962C8B-B14F-4D97-AF65-F5344CB8AC3E}">
-        <p14:creationId xmlns:p14="http://schemas.microsoft.com/office/powerpoint/2010/main" val="471916757"/>
+        <p14:creationId xmlns:p14="http://schemas.microsoft.com/office/powerpoint/2010/main" val="4019570459"/>
       </p:ext>
     </p:extLst>
   </p:cSld>
   <p:clrMapOvr>
     <a:masterClrMapping/>
   </p:clrMapOvr>
-  <p:timing>
-    <p:tnLst>
-      <p:par>
-        <p:cTn id="1" dur="indefinite" restart="never" nodeType="tmRoot"/>
-      </p:par>
-    </p:tnLst>
-  </p:timing>
 </p:sld>
 </file>
 
@@ -13240,7 +14205,7 @@
           <a:p>
             <a:r>
               <a:rPr lang="hu-HU" dirty="0" smtClean="0"/>
-              <a:t>Rendszerterv</a:t>
+              <a:t>Specifikáció</a:t>
             </a:r>
             <a:endParaRPr lang="hu-HU" dirty="0"/>
           </a:p>
@@ -13248,7 +14213,7 @@
       </p:sp>
       <p:sp>
         <p:nvSpPr>
-          <p:cNvPr id="5" name="Tartalom helye 4"/>
+          <p:cNvPr id="3" name="Tartalom helye 2"/>
           <p:cNvSpPr>
             <a:spLocks noGrp="1"/>
           </p:cNvSpPr>
@@ -13267,11 +14232,7 @@
             </a:pPr>
             <a:r>
               <a:rPr lang="hu-HU" dirty="0" smtClean="0"/>
-              <a:t>Különböző modulok különböző feladatok </a:t>
-            </a:r>
-            <a:r>
-              <a:rPr lang="hu-HU" dirty="0" smtClean="0"/>
-              <a:t>végrehajtására</a:t>
+              <a:t>Változásokat tartalmazó fájlok felhasználása</a:t>
             </a:r>
             <a:br>
               <a:rPr lang="hu-HU" dirty="0" smtClean="0"/>
@@ -13285,11 +14246,7 @@
             </a:pPr>
             <a:r>
               <a:rPr lang="hu-HU" dirty="0" smtClean="0"/>
-              <a:t>Adatbázis szerver oldali tárolt </a:t>
-            </a:r>
-            <a:r>
-              <a:rPr lang="hu-HU" dirty="0" smtClean="0"/>
-              <a:t>eljárások</a:t>
+              <a:t>Grafikus felhasználói felület</a:t>
             </a:r>
             <a:br>
               <a:rPr lang="hu-HU" dirty="0" smtClean="0"/>
@@ -13303,7 +14260,7 @@
             </a:pPr>
             <a:r>
               <a:rPr lang="hu-HU" dirty="0" smtClean="0"/>
-              <a:t>Tranzakciók visszagörgetése</a:t>
+              <a:t>Adatbázis oldali tárolt eljárások</a:t>
             </a:r>
             <a:br>
               <a:rPr lang="hu-HU" dirty="0" smtClean="0"/>
@@ -13317,7 +14274,21 @@
             </a:pPr>
             <a:r>
               <a:rPr lang="hu-HU" dirty="0" smtClean="0"/>
-              <a:t>Vezérlő osztályok a modulok közti kapcsolathoz</a:t>
+              <a:t>Folyamat naplózása</a:t>
+            </a:r>
+            <a:br>
+              <a:rPr lang="hu-HU" dirty="0" smtClean="0"/>
+            </a:br>
+            <a:endParaRPr lang="hu-HU" dirty="0" smtClean="0"/>
+          </a:p>
+          <a:p>
+            <a:pPr>
+              <a:buFont typeface="Arial" panose="020B0604020202020204" pitchFamily="34" charset="0"/>
+              <a:buChar char="•"/>
+            </a:pPr>
+            <a:r>
+              <a:rPr lang="hu-HU" dirty="0" smtClean="0"/>
+              <a:t>Adatbázis visszaállítása</a:t>
             </a:r>
             <a:endParaRPr lang="hu-HU" dirty="0"/>
           </a:p>
@@ -13325,7 +14296,7 @@
       </p:sp>
       <p:sp>
         <p:nvSpPr>
-          <p:cNvPr id="3" name="Dia számának helye 2"/>
+          <p:cNvPr id="4" name="Dia számának helye 3"/>
           <p:cNvSpPr>
             <a:spLocks noGrp="1"/>
           </p:cNvSpPr>
@@ -13349,7 +14320,7 @@
     </p:spTree>
     <p:extLst>
       <p:ext uri="{BB962C8B-B14F-4D97-AF65-F5344CB8AC3E}">
-        <p14:creationId xmlns:p14="http://schemas.microsoft.com/office/powerpoint/2010/main" val="1663600243"/>
+        <p14:creationId xmlns:p14="http://schemas.microsoft.com/office/powerpoint/2010/main" val="471916757"/>
       </p:ext>
     </p:extLst>
   </p:cSld>
@@ -13406,34 +14377,86 @@
           </a:p>
         </p:txBody>
       </p:sp>
-      <p:graphicFrame>
-        <p:nvGraphicFramePr>
-          <p:cNvPr id="4" name="Tartalom helye 3"/>
-          <p:cNvGraphicFramePr>
-            <a:graphicFrameLocks noGrp="1"/>
-          </p:cNvGraphicFramePr>
+      <p:sp>
+        <p:nvSpPr>
+          <p:cNvPr id="5" name="Tartalom helye 4"/>
+          <p:cNvSpPr>
+            <a:spLocks noGrp="1"/>
+          </p:cNvSpPr>
           <p:nvPr>
             <p:ph idx="1"/>
-            <p:extLst>
-              <p:ext uri="{D42A27DB-BD31-4B8C-83A1-F6EECF244321}">
-                <p14:modId xmlns:p14="http://schemas.microsoft.com/office/powerpoint/2010/main" val="528362638"/>
-              </p:ext>
-            </p:extLst>
           </p:nvPr>
-        </p:nvGraphicFramePr>
-        <p:xfrm>
-          <a:off x="1103313" y="2052638"/>
-          <a:ext cx="8947150" cy="4195762"/>
-        </p:xfrm>
-        <a:graphic>
-          <a:graphicData uri="http://schemas.openxmlformats.org/drawingml/2006/diagram">
-            <dgm:relIds xmlns:dgm="http://schemas.openxmlformats.org/drawingml/2006/diagram" xmlns:r="http://schemas.openxmlformats.org/officeDocument/2006/relationships" r:dm="rId2" r:lo="rId3" r:qs="rId4" r:cs="rId5"/>
-          </a:graphicData>
-        </a:graphic>
-      </p:graphicFrame>
-      <p:sp>
-        <p:nvSpPr>
-          <p:cNvPr id="5" name="Dia számának helye 4"/>
+        </p:nvSpPr>
+        <p:spPr/>
+        <p:txBody>
+          <a:bodyPr anchor="ctr"/>
+          <a:lstStyle/>
+          <a:p>
+            <a:pPr>
+              <a:buFont typeface="Arial" panose="020B0604020202020204" pitchFamily="34" charset="0"/>
+              <a:buChar char="•"/>
+            </a:pPr>
+            <a:r>
+              <a:rPr lang="hu-HU" dirty="0" smtClean="0"/>
+              <a:t>Különböző modulok különböző feladatok végrehajtására</a:t>
+            </a:r>
+            <a:br>
+              <a:rPr lang="hu-HU" dirty="0" smtClean="0"/>
+            </a:br>
+            <a:endParaRPr lang="hu-HU" dirty="0" smtClean="0"/>
+          </a:p>
+          <a:p>
+            <a:pPr>
+              <a:buFont typeface="Arial" panose="020B0604020202020204" pitchFamily="34" charset="0"/>
+              <a:buChar char="•"/>
+            </a:pPr>
+            <a:r>
+              <a:rPr lang="hu-HU" dirty="0" smtClean="0"/>
+              <a:t>Adatbázis szerver oldali tárolt </a:t>
+            </a:r>
+            <a:r>
+              <a:rPr lang="hu-HU" dirty="0" smtClean="0"/>
+              <a:t>eljárások</a:t>
+            </a:r>
+            <a:br>
+              <a:rPr lang="hu-HU" dirty="0" smtClean="0"/>
+            </a:br>
+            <a:endParaRPr lang="hu-HU" dirty="0" smtClean="0"/>
+          </a:p>
+          <a:p>
+            <a:pPr>
+              <a:buFont typeface="Arial" panose="020B0604020202020204" pitchFamily="34" charset="0"/>
+              <a:buChar char="•"/>
+            </a:pPr>
+            <a:r>
+              <a:rPr lang="hu-HU" dirty="0" smtClean="0"/>
+              <a:t>Fájl feldolgozás</a:t>
+            </a:r>
+            <a:r>
+              <a:rPr lang="hu-HU" dirty="0" smtClean="0"/>
+              <a:t/>
+            </a:r>
+            <a:br>
+              <a:rPr lang="hu-HU" dirty="0" smtClean="0"/>
+            </a:br>
+            <a:endParaRPr lang="hu-HU" dirty="0" smtClean="0"/>
+          </a:p>
+          <a:p>
+            <a:pPr>
+              <a:buFont typeface="Arial" panose="020B0604020202020204" pitchFamily="34" charset="0"/>
+              <a:buChar char="•"/>
+            </a:pPr>
+            <a:r>
+              <a:rPr lang="hu-HU" dirty="0" smtClean="0"/>
+              <a:t>Vezérlő osztályok a modulok közti kapcsolathoz</a:t>
+            </a:r>
+            <a:endParaRPr lang="hu-HU" dirty="0"/>
+          </a:p>
+        </p:txBody>
+      </p:sp>
+      <p:sp>
+        <p:nvSpPr>
+          <p:cNvPr id="3" name="Dia számának helye 2"/>
           <p:cNvSpPr>
             <a:spLocks noGrp="1"/>
           </p:cNvSpPr>
@@ -13457,7 +14480,7 @@
     </p:spTree>
     <p:extLst>
       <p:ext uri="{BB962C8B-B14F-4D97-AF65-F5344CB8AC3E}">
-        <p14:creationId xmlns:p14="http://schemas.microsoft.com/office/powerpoint/2010/main" val="808255815"/>
+        <p14:creationId xmlns:p14="http://schemas.microsoft.com/office/powerpoint/2010/main" val="1663600243"/>
       </p:ext>
     </p:extLst>
   </p:cSld>
@@ -13508,134 +14531,40 @@
           <a:p>
             <a:r>
               <a:rPr lang="hu-HU" dirty="0" smtClean="0"/>
-              <a:t>Technológiák</a:t>
+              <a:t>Rendszerterv</a:t>
             </a:r>
             <a:endParaRPr lang="hu-HU" dirty="0"/>
           </a:p>
         </p:txBody>
       </p:sp>
-      <p:sp>
-        <p:nvSpPr>
-          <p:cNvPr id="3" name="Tartalom helye 2"/>
-          <p:cNvSpPr>
-            <a:spLocks noGrp="1"/>
-          </p:cNvSpPr>
+      <p:graphicFrame>
+        <p:nvGraphicFramePr>
+          <p:cNvPr id="4" name="Tartalom helye 3"/>
+          <p:cNvGraphicFramePr>
+            <a:graphicFrameLocks noGrp="1"/>
+          </p:cNvGraphicFramePr>
           <p:nvPr>
             <p:ph idx="1"/>
+            <p:extLst>
+              <p:ext uri="{D42A27DB-BD31-4B8C-83A1-F6EECF244321}">
+                <p14:modId xmlns:p14="http://schemas.microsoft.com/office/powerpoint/2010/main" val="528362638"/>
+              </p:ext>
+            </p:extLst>
           </p:nvPr>
-        </p:nvSpPr>
-        <p:spPr/>
-        <p:txBody>
-          <a:bodyPr anchor="ctr"/>
-          <a:lstStyle/>
-          <a:p>
-            <a:pPr>
-              <a:buFont typeface="Arial" panose="020B0604020202020204" pitchFamily="34" charset="0"/>
-              <a:buChar char="•"/>
-            </a:pPr>
-            <a:r>
-              <a:rPr lang="hu-HU" dirty="0" err="1" smtClean="0"/>
-              <a:t>Postgres</a:t>
-            </a:r>
-            <a:r>
-              <a:rPr lang="hu-HU" dirty="0" smtClean="0"/>
-              <a:t> adatbázis-kezelő rendszer</a:t>
-            </a:r>
-            <a:br>
-              <a:rPr lang="hu-HU" dirty="0" smtClean="0"/>
-            </a:br>
-            <a:endParaRPr lang="hu-HU" dirty="0" smtClean="0"/>
-          </a:p>
-          <a:p>
-            <a:pPr>
-              <a:buFont typeface="Arial" panose="020B0604020202020204" pitchFamily="34" charset="0"/>
-              <a:buChar char="•"/>
-            </a:pPr>
-            <a:r>
-              <a:rPr lang="hu-HU" dirty="0" smtClean="0"/>
-              <a:t>Java programozási nyelv</a:t>
-            </a:r>
-            <a:br>
-              <a:rPr lang="hu-HU" dirty="0" smtClean="0"/>
-            </a:br>
-            <a:endParaRPr lang="hu-HU" dirty="0" smtClean="0"/>
-          </a:p>
-          <a:p>
-            <a:pPr lvl="1">
-              <a:buFont typeface="Arial" panose="020B0604020202020204" pitchFamily="34" charset="0"/>
-              <a:buChar char="•"/>
-            </a:pPr>
-            <a:r>
-              <a:rPr lang="hu-HU" dirty="0" smtClean="0"/>
-              <a:t>JDBC (Java </a:t>
-            </a:r>
-            <a:r>
-              <a:rPr lang="hu-HU" dirty="0" err="1" smtClean="0"/>
-              <a:t>Database</a:t>
-            </a:r>
-            <a:r>
-              <a:rPr lang="hu-HU" dirty="0" smtClean="0"/>
-              <a:t> </a:t>
-            </a:r>
-            <a:r>
-              <a:rPr lang="hu-HU" dirty="0" err="1" smtClean="0"/>
-              <a:t>Connectivity</a:t>
-            </a:r>
-            <a:r>
-              <a:rPr lang="hu-HU" dirty="0" smtClean="0"/>
-              <a:t>)</a:t>
-            </a:r>
-            <a:br>
-              <a:rPr lang="hu-HU" dirty="0" smtClean="0"/>
-            </a:br>
-            <a:endParaRPr lang="hu-HU" dirty="0" smtClean="0"/>
-          </a:p>
-          <a:p>
-            <a:pPr lvl="1">
-              <a:buFont typeface="Arial" panose="020B0604020202020204" pitchFamily="34" charset="0"/>
-              <a:buChar char="•"/>
-            </a:pPr>
-            <a:r>
-              <a:rPr lang="hu-HU" dirty="0" err="1" smtClean="0"/>
-              <a:t>JavaFx</a:t>
-            </a:r>
-            <a:r>
-              <a:rPr lang="hu-HU" dirty="0" smtClean="0"/>
-              <a:t/>
-            </a:r>
-            <a:br>
-              <a:rPr lang="hu-HU" dirty="0" smtClean="0"/>
-            </a:br>
-            <a:endParaRPr lang="hu-HU" dirty="0" smtClean="0"/>
-          </a:p>
-          <a:p>
-            <a:pPr lvl="1">
-              <a:buFont typeface="Arial" panose="020B0604020202020204" pitchFamily="34" charset="0"/>
-              <a:buChar char="•"/>
-            </a:pPr>
-            <a:r>
-              <a:rPr lang="hu-HU" dirty="0" err="1" smtClean="0"/>
-              <a:t>Apache</a:t>
-            </a:r>
-            <a:r>
-              <a:rPr lang="hu-HU" dirty="0" smtClean="0"/>
-              <a:t> </a:t>
-            </a:r>
-            <a:r>
-              <a:rPr lang="hu-HU" dirty="0" err="1" smtClean="0"/>
-              <a:t>Commons</a:t>
-            </a:r>
-            <a:r>
-              <a:rPr lang="hu-HU" dirty="0" smtClean="0"/>
-              <a:t> IO</a:t>
-            </a:r>
-            <a:endParaRPr lang="hu-HU" dirty="0"/>
-          </a:p>
-        </p:txBody>
-      </p:sp>
-      <p:sp>
-        <p:nvSpPr>
-          <p:cNvPr id="4" name="Dia számának helye 3"/>
+        </p:nvGraphicFramePr>
+        <p:xfrm>
+          <a:off x="1103313" y="2052638"/>
+          <a:ext cx="8947150" cy="4195762"/>
+        </p:xfrm>
+        <a:graphic>
+          <a:graphicData uri="http://schemas.openxmlformats.org/drawingml/2006/diagram">
+            <dgm:relIds xmlns:dgm="http://schemas.openxmlformats.org/drawingml/2006/diagram" xmlns:r="http://schemas.openxmlformats.org/officeDocument/2006/relationships" r:dm="rId2" r:lo="rId3" r:qs="rId4" r:cs="rId5"/>
+          </a:graphicData>
+        </a:graphic>
+      </p:graphicFrame>
+      <p:sp>
+        <p:nvSpPr>
+          <p:cNvPr id="5" name="Dia számának helye 4"/>
           <p:cNvSpPr>
             <a:spLocks noGrp="1"/>
           </p:cNvSpPr>
@@ -13659,7 +14588,7 @@
     </p:spTree>
     <p:extLst>
       <p:ext uri="{BB962C8B-B14F-4D97-AF65-F5344CB8AC3E}">
-        <p14:creationId xmlns:p14="http://schemas.microsoft.com/office/powerpoint/2010/main" val="1956989532"/>
+        <p14:creationId xmlns:p14="http://schemas.microsoft.com/office/powerpoint/2010/main" val="808255815"/>
       </p:ext>
     </p:extLst>
   </p:cSld>

</xml_diff>